<commit_message>
update the kick-off presentation
</commit_message>
<xml_diff>
--- a/meetings/1- Kick-off meeting.pptx
+++ b/meetings/1- Kick-off meeting.pptx
@@ -13,8 +13,9 @@
     <p:sldId id="261" r:id="rId7"/>
     <p:sldId id="263" r:id="rId8"/>
     <p:sldId id="260" r:id="rId9"/>
-    <p:sldId id="262" r:id="rId10"/>
-    <p:sldId id="264" r:id="rId11"/>
+    <p:sldId id="266" r:id="rId10"/>
+    <p:sldId id="262" r:id="rId11"/>
+    <p:sldId id="264" r:id="rId12"/>
   </p:sldIdLst>
   <p:sldSz cx="9144000" cy="6858000" type="screen4x3"/>
   <p:notesSz cx="6858000" cy="9144000"/>
@@ -3176,6 +3177,120 @@
             <p:ph type="title"/>
           </p:nvPr>
         </p:nvSpPr>
+        <p:spPr/>
+        <p:txBody>
+          <a:bodyPr/>
+          <a:lstStyle/>
+          <a:p>
+            <a:r>
+              <a:rPr lang="en-US" dirty="0" smtClean="0"/>
+              <a:t>Which one?</a:t>
+            </a:r>
+            <a:endParaRPr lang="en-US" dirty="0"/>
+          </a:p>
+        </p:txBody>
+      </p:sp>
+      <p:sp>
+        <p:nvSpPr>
+          <p:cNvPr id="3" name="Content Placeholder 2"/>
+          <p:cNvSpPr>
+            <a:spLocks noGrp="1"/>
+          </p:cNvSpPr>
+          <p:nvPr>
+            <p:ph idx="1"/>
+          </p:nvPr>
+        </p:nvSpPr>
+        <p:spPr/>
+        <p:txBody>
+          <a:bodyPr>
+            <a:normAutofit lnSpcReduction="10000"/>
+          </a:bodyPr>
+          <a:lstStyle/>
+          <a:p>
+            <a:r>
+              <a:rPr lang="en-US" dirty="0" smtClean="0"/>
+              <a:t>Adaptive agent on high/ medium /low strategy level.</a:t>
+            </a:r>
+          </a:p>
+          <a:p>
+            <a:endParaRPr lang="en-US" dirty="0" smtClean="0"/>
+          </a:p>
+          <a:p>
+            <a:r>
+              <a:rPr lang="en-US" dirty="0" smtClean="0"/>
+              <a:t>Collaboration</a:t>
+            </a:r>
+          </a:p>
+          <a:p>
+            <a:endParaRPr lang="en-US" dirty="0" smtClean="0"/>
+          </a:p>
+          <a:p>
+            <a:r>
+              <a:rPr lang="en-US" dirty="0" smtClean="0"/>
+              <a:t>Knowledge sharing</a:t>
+            </a:r>
+          </a:p>
+          <a:p>
+            <a:endParaRPr lang="en-US" dirty="0"/>
+          </a:p>
+          <a:p>
+            <a:r>
+              <a:rPr lang="en-US" dirty="0" smtClean="0"/>
+              <a:t>Anything else?</a:t>
+            </a:r>
+          </a:p>
+          <a:p>
+            <a:endParaRPr lang="en-US" dirty="0"/>
+          </a:p>
+        </p:txBody>
+      </p:sp>
+    </p:spTree>
+    <p:extLst>
+      <p:ext uri="{BB962C8B-B14F-4D97-AF65-F5344CB8AC3E}">
+        <p14:creationId xmlns:p14="http://schemas.microsoft.com/office/powerpoint/2010/main" val="159122329"/>
+      </p:ext>
+    </p:extLst>
+  </p:cSld>
+  <p:clrMapOvr>
+    <a:masterClrMapping/>
+  </p:clrMapOvr>
+  <p:timing>
+    <p:tnLst>
+      <p:par>
+        <p:cTn id="1" dur="indefinite" restart="never" nodeType="tmRoot"/>
+      </p:par>
+    </p:tnLst>
+  </p:timing>
+</p:sld>
+</file>
+
+<file path=ppt/slides/slide11.xml><?xml version="1.0" encoding="utf-8"?>
+<p:sld xmlns:a="http://schemas.openxmlformats.org/drawingml/2006/main" xmlns:r="http://schemas.openxmlformats.org/officeDocument/2006/relationships" xmlns:p="http://schemas.openxmlformats.org/presentationml/2006/main">
+  <p:cSld>
+    <p:spTree>
+      <p:nvGrpSpPr>
+        <p:cNvPr id="1" name=""/>
+        <p:cNvGrpSpPr/>
+        <p:nvPr/>
+      </p:nvGrpSpPr>
+      <p:grpSpPr>
+        <a:xfrm>
+          <a:off x="0" y="0"/>
+          <a:ext cx="0" cy="0"/>
+          <a:chOff x="0" y="0"/>
+          <a:chExt cx="0" cy="0"/>
+        </a:xfrm>
+      </p:grpSpPr>
+      <p:sp>
+        <p:nvSpPr>
+          <p:cNvPr id="2" name="Title 1"/>
+          <p:cNvSpPr>
+            <a:spLocks noGrp="1"/>
+          </p:cNvSpPr>
+          <p:nvPr>
+            <p:ph type="title"/>
+          </p:nvPr>
+        </p:nvSpPr>
         <p:spPr>
           <a:xfrm>
             <a:off x="457200" y="2819400"/>
@@ -3303,8 +3418,9 @@
           <a:p>
             <a:r>
               <a:rPr lang="en-US" dirty="0" smtClean="0"/>
-              <a:t>Research directions</a:t>
-            </a:r>
+              <a:t>Demo</a:t>
+            </a:r>
+            <a:endParaRPr lang="en-US" dirty="0" smtClean="0"/>
           </a:p>
           <a:p>
             <a:r>
@@ -4198,7 +4314,7 @@
           <a:p>
             <a:r>
               <a:rPr lang="en-US" dirty="0" smtClean="0"/>
-              <a:t>Which one?</a:t>
+              <a:t>Project resources</a:t>
             </a:r>
             <a:endParaRPr lang="en-US" dirty="0"/>
           </a:p>
@@ -4216,44 +4332,67 @@
         </p:nvSpPr>
         <p:spPr/>
         <p:txBody>
-          <a:bodyPr>
-            <a:normAutofit lnSpcReduction="10000"/>
-          </a:bodyPr>
-          <a:lstStyle/>
-          <a:p>
-            <a:r>
-              <a:rPr lang="en-US" dirty="0" smtClean="0"/>
-              <a:t>Adaptive agent on high/ medium /low strategy level.</a:t>
-            </a:r>
-          </a:p>
-          <a:p>
+          <a:bodyPr/>
+          <a:lstStyle/>
+          <a:p>
+            <a:r>
+              <a:rPr lang="en-US" dirty="0" smtClean="0"/>
+              <a:t>Thesis work: </a:t>
+            </a:r>
+            <a:r>
+              <a:rPr lang="en-US" dirty="0">
+                <a:hlinkClick r:id="rId2"/>
+              </a:rPr>
+              <a:t>https://</a:t>
+            </a:r>
+            <a:r>
+              <a:rPr lang="en-US" dirty="0" smtClean="0">
+                <a:hlinkClick r:id="rId2"/>
+              </a:rPr>
+              <a:t>github.com/ogail/thesis</a:t>
+            </a:r>
             <a:endParaRPr lang="en-US" dirty="0" smtClean="0"/>
           </a:p>
           <a:p>
-            <a:r>
-              <a:rPr lang="en-US" dirty="0" smtClean="0"/>
-              <a:t>Collaboration</a:t>
-            </a:r>
-          </a:p>
-          <a:p>
+            <a:endParaRPr lang="en-US" dirty="0"/>
+          </a:p>
+          <a:p>
+            <a:r>
+              <a:rPr lang="en-US" dirty="0" err="1" smtClean="0"/>
+              <a:t>Src</a:t>
+            </a:r>
+            <a:r>
+              <a:rPr lang="en-US" dirty="0" smtClean="0"/>
+              <a:t> code for the engine: </a:t>
+            </a:r>
+            <a:r>
+              <a:rPr lang="en-US" dirty="0">
+                <a:hlinkClick r:id="rId3"/>
+              </a:rPr>
+              <a:t>https://</a:t>
+            </a:r>
+            <a:r>
+              <a:rPr lang="en-US" dirty="0" smtClean="0">
+                <a:hlinkClick r:id="rId3"/>
+              </a:rPr>
+              <a:t>github.com/ogail/istrategizer</a:t>
+            </a:r>
             <a:endParaRPr lang="en-US" dirty="0" smtClean="0"/>
           </a:p>
           <a:p>
-            <a:r>
-              <a:rPr lang="en-US" dirty="0" smtClean="0"/>
-              <a:t>Knowledge sharing</a:t>
-            </a:r>
-          </a:p>
-          <a:p>
             <a:endParaRPr lang="en-US" dirty="0"/>
           </a:p>
           <a:p>
             <a:r>
-              <a:rPr lang="en-US" dirty="0" smtClean="0"/>
-              <a:t>Anything else?</a:t>
-            </a:r>
-          </a:p>
-          <a:p>
+              <a:rPr lang="en-US" smtClean="0"/>
+              <a:t>Demo: </a:t>
+            </a:r>
+            <a:r>
+              <a:rPr lang="en-US">
+                <a:hlinkClick r:id="rId4"/>
+              </a:rPr>
+              <a:t>http://www.youtube.com/watch?v=pHnX4xU1ojQ</a:t>
+            </a:r>
             <a:endParaRPr lang="en-US" dirty="0"/>
           </a:p>
         </p:txBody>
@@ -4261,20 +4400,13 @@
     </p:spTree>
     <p:extLst>
       <p:ext uri="{BB962C8B-B14F-4D97-AF65-F5344CB8AC3E}">
-        <p14:creationId xmlns:p14="http://schemas.microsoft.com/office/powerpoint/2010/main" val="159122329"/>
+        <p14:creationId xmlns:p14="http://schemas.microsoft.com/office/powerpoint/2010/main" val="3099975016"/>
       </p:ext>
     </p:extLst>
   </p:cSld>
   <p:clrMapOvr>
     <a:masterClrMapping/>
   </p:clrMapOvr>
-  <p:timing>
-    <p:tnLst>
-      <p:par>
-        <p:cTn id="1" dur="indefinite" restart="never" nodeType="tmRoot"/>
-      </p:par>
-    </p:tnLst>
-  </p:timing>
 </p:sld>
 </file>
 

</xml_diff>

<commit_message>
Updates afer first meeting
</commit_message>
<xml_diff>
--- a/meetings/1- Kick-off meeting.pptx
+++ b/meetings/1- Kick-off meeting.pptx
@@ -13,9 +13,10 @@
     <p:sldId id="261" r:id="rId7"/>
     <p:sldId id="263" r:id="rId8"/>
     <p:sldId id="260" r:id="rId9"/>
-    <p:sldId id="266" r:id="rId10"/>
-    <p:sldId id="262" r:id="rId11"/>
-    <p:sldId id="264" r:id="rId12"/>
+    <p:sldId id="267" r:id="rId10"/>
+    <p:sldId id="266" r:id="rId11"/>
+    <p:sldId id="262" r:id="rId12"/>
+    <p:sldId id="264" r:id="rId13"/>
   </p:sldIdLst>
   <p:sldSz cx="9144000" cy="6858000" type="screen4x3"/>
   <p:notesSz cx="6858000" cy="9144000"/>
@@ -299,7 +300,7 @@
             <a:fld id="{1D8BD707-D9CF-40AE-B4C6-C98DA3205C09}" type="datetimeFigureOut">
               <a:rPr lang="en-US" smtClean="0"/>
               <a:pPr/>
-              <a:t>11/15/2013</a:t>
+              <a:t>11/17/2013</a:t>
             </a:fld>
             <a:endParaRPr lang="en-US"/>
           </a:p>
@@ -466,7 +467,7 @@
             <a:fld id="{1D8BD707-D9CF-40AE-B4C6-C98DA3205C09}" type="datetimeFigureOut">
               <a:rPr lang="en-US" smtClean="0"/>
               <a:pPr/>
-              <a:t>11/15/2013</a:t>
+              <a:t>11/17/2013</a:t>
             </a:fld>
             <a:endParaRPr lang="en-US"/>
           </a:p>
@@ -643,7 +644,7 @@
             <a:fld id="{1D8BD707-D9CF-40AE-B4C6-C98DA3205C09}" type="datetimeFigureOut">
               <a:rPr lang="en-US" smtClean="0"/>
               <a:pPr/>
-              <a:t>11/15/2013</a:t>
+              <a:t>11/17/2013</a:t>
             </a:fld>
             <a:endParaRPr lang="en-US"/>
           </a:p>
@@ -810,7 +811,7 @@
             <a:fld id="{1D8BD707-D9CF-40AE-B4C6-C98DA3205C09}" type="datetimeFigureOut">
               <a:rPr lang="en-US" smtClean="0"/>
               <a:pPr/>
-              <a:t>11/15/2013</a:t>
+              <a:t>11/17/2013</a:t>
             </a:fld>
             <a:endParaRPr lang="en-US"/>
           </a:p>
@@ -1053,7 +1054,7 @@
             <a:fld id="{1D8BD707-D9CF-40AE-B4C6-C98DA3205C09}" type="datetimeFigureOut">
               <a:rPr lang="en-US" smtClean="0"/>
               <a:pPr/>
-              <a:t>11/15/2013</a:t>
+              <a:t>11/17/2013</a:t>
             </a:fld>
             <a:endParaRPr lang="en-US"/>
           </a:p>
@@ -1338,7 +1339,7 @@
             <a:fld id="{1D8BD707-D9CF-40AE-B4C6-C98DA3205C09}" type="datetimeFigureOut">
               <a:rPr lang="en-US" smtClean="0"/>
               <a:pPr/>
-              <a:t>11/15/2013</a:t>
+              <a:t>11/17/2013</a:t>
             </a:fld>
             <a:endParaRPr lang="en-US"/>
           </a:p>
@@ -1757,7 +1758,7 @@
             <a:fld id="{1D8BD707-D9CF-40AE-B4C6-C98DA3205C09}" type="datetimeFigureOut">
               <a:rPr lang="en-US" smtClean="0"/>
               <a:pPr/>
-              <a:t>11/15/2013</a:t>
+              <a:t>11/17/2013</a:t>
             </a:fld>
             <a:endParaRPr lang="en-US"/>
           </a:p>
@@ -1872,7 +1873,7 @@
             <a:fld id="{1D8BD707-D9CF-40AE-B4C6-C98DA3205C09}" type="datetimeFigureOut">
               <a:rPr lang="en-US" smtClean="0"/>
               <a:pPr/>
-              <a:t>11/15/2013</a:t>
+              <a:t>11/17/2013</a:t>
             </a:fld>
             <a:endParaRPr lang="en-US"/>
           </a:p>
@@ -1964,7 +1965,7 @@
             <a:fld id="{1D8BD707-D9CF-40AE-B4C6-C98DA3205C09}" type="datetimeFigureOut">
               <a:rPr lang="en-US" smtClean="0"/>
               <a:pPr/>
-              <a:t>11/15/2013</a:t>
+              <a:t>11/17/2013</a:t>
             </a:fld>
             <a:endParaRPr lang="en-US"/>
           </a:p>
@@ -2238,7 +2239,7 @@
             <a:fld id="{1D8BD707-D9CF-40AE-B4C6-C98DA3205C09}" type="datetimeFigureOut">
               <a:rPr lang="en-US" smtClean="0"/>
               <a:pPr/>
-              <a:t>11/15/2013</a:t>
+              <a:t>11/17/2013</a:t>
             </a:fld>
             <a:endParaRPr lang="en-US"/>
           </a:p>
@@ -2488,7 +2489,7 @@
             <a:fld id="{1D8BD707-D9CF-40AE-B4C6-C98DA3205C09}" type="datetimeFigureOut">
               <a:rPr lang="en-US" smtClean="0"/>
               <a:pPr/>
-              <a:t>11/15/2013</a:t>
+              <a:t>11/17/2013</a:t>
             </a:fld>
             <a:endParaRPr lang="en-US"/>
           </a:p>
@@ -2698,7 +2699,7 @@
             <a:fld id="{1D8BD707-D9CF-40AE-B4C6-C98DA3205C09}" type="datetimeFigureOut">
               <a:rPr lang="en-US" smtClean="0"/>
               <a:pPr/>
-              <a:t>11/15/2013</a:t>
+              <a:t>11/17/2013</a:t>
             </a:fld>
             <a:endParaRPr lang="en-US"/>
           </a:p>
@@ -3184,7 +3185,7 @@
           <a:p>
             <a:r>
               <a:rPr lang="en-US" dirty="0" smtClean="0"/>
-              <a:t>Which one?</a:t>
+              <a:t>Project resources</a:t>
             </a:r>
             <a:endParaRPr lang="en-US" dirty="0"/>
           </a:p>
@@ -3202,44 +3203,67 @@
         </p:nvSpPr>
         <p:spPr/>
         <p:txBody>
-          <a:bodyPr>
-            <a:normAutofit lnSpcReduction="10000"/>
-          </a:bodyPr>
-          <a:lstStyle/>
-          <a:p>
-            <a:r>
-              <a:rPr lang="en-US" dirty="0" smtClean="0"/>
-              <a:t>Adaptive agent on high/ medium /low strategy level.</a:t>
-            </a:r>
-          </a:p>
-          <a:p>
+          <a:bodyPr/>
+          <a:lstStyle/>
+          <a:p>
+            <a:r>
+              <a:rPr lang="en-US" dirty="0" smtClean="0"/>
+              <a:t>Thesis work: </a:t>
+            </a:r>
+            <a:r>
+              <a:rPr lang="en-US" dirty="0">
+                <a:hlinkClick r:id="rId2"/>
+              </a:rPr>
+              <a:t>https://</a:t>
+            </a:r>
+            <a:r>
+              <a:rPr lang="en-US" dirty="0" smtClean="0">
+                <a:hlinkClick r:id="rId2"/>
+              </a:rPr>
+              <a:t>github.com/ogail/thesis</a:t>
+            </a:r>
             <a:endParaRPr lang="en-US" dirty="0" smtClean="0"/>
           </a:p>
           <a:p>
-            <a:r>
-              <a:rPr lang="en-US" dirty="0" smtClean="0"/>
-              <a:t>Collaboration</a:t>
-            </a:r>
-          </a:p>
-          <a:p>
+            <a:endParaRPr lang="en-US" dirty="0"/>
+          </a:p>
+          <a:p>
+            <a:r>
+              <a:rPr lang="en-US" dirty="0" err="1" smtClean="0"/>
+              <a:t>Src</a:t>
+            </a:r>
+            <a:r>
+              <a:rPr lang="en-US" dirty="0" smtClean="0"/>
+              <a:t> code for the engine: </a:t>
+            </a:r>
+            <a:r>
+              <a:rPr lang="en-US" dirty="0">
+                <a:hlinkClick r:id="rId3"/>
+              </a:rPr>
+              <a:t>https://</a:t>
+            </a:r>
+            <a:r>
+              <a:rPr lang="en-US" dirty="0" smtClean="0">
+                <a:hlinkClick r:id="rId3"/>
+              </a:rPr>
+              <a:t>github.com/ogail/istrategizer</a:t>
+            </a:r>
             <a:endParaRPr lang="en-US" dirty="0" smtClean="0"/>
           </a:p>
           <a:p>
-            <a:r>
-              <a:rPr lang="en-US" dirty="0" smtClean="0"/>
-              <a:t>Knowledge sharing</a:t>
-            </a:r>
-          </a:p>
-          <a:p>
             <a:endParaRPr lang="en-US" dirty="0"/>
           </a:p>
           <a:p>
             <a:r>
               <a:rPr lang="en-US" dirty="0" smtClean="0"/>
-              <a:t>Anything else?</a:t>
-            </a:r>
-          </a:p>
-          <a:p>
+              <a:t>Demo: </a:t>
+            </a:r>
+            <a:r>
+              <a:rPr lang="en-US" dirty="0">
+                <a:hlinkClick r:id="rId4"/>
+              </a:rPr>
+              <a:t>http://www.youtube.com/watch?v=pHnX4xU1ojQ</a:t>
+            </a:r>
             <a:endParaRPr lang="en-US" dirty="0"/>
           </a:p>
         </p:txBody>
@@ -3247,7 +3271,7 @@
     </p:spTree>
     <p:extLst>
       <p:ext uri="{BB962C8B-B14F-4D97-AF65-F5344CB8AC3E}">
-        <p14:creationId xmlns:p14="http://schemas.microsoft.com/office/powerpoint/2010/main" val="159122329"/>
+        <p14:creationId xmlns:p14="http://schemas.microsoft.com/office/powerpoint/2010/main" val="3099975016"/>
       </p:ext>
     </p:extLst>
   </p:cSld>
@@ -3291,6 +3315,120 @@
             <p:ph type="title"/>
           </p:nvPr>
         </p:nvSpPr>
+        <p:spPr/>
+        <p:txBody>
+          <a:bodyPr/>
+          <a:lstStyle/>
+          <a:p>
+            <a:r>
+              <a:rPr lang="en-US" dirty="0" smtClean="0"/>
+              <a:t>Which one?</a:t>
+            </a:r>
+            <a:endParaRPr lang="en-US" dirty="0"/>
+          </a:p>
+        </p:txBody>
+      </p:sp>
+      <p:sp>
+        <p:nvSpPr>
+          <p:cNvPr id="3" name="Content Placeholder 2"/>
+          <p:cNvSpPr>
+            <a:spLocks noGrp="1"/>
+          </p:cNvSpPr>
+          <p:nvPr>
+            <p:ph idx="1"/>
+          </p:nvPr>
+        </p:nvSpPr>
+        <p:spPr/>
+        <p:txBody>
+          <a:bodyPr>
+            <a:normAutofit lnSpcReduction="10000"/>
+          </a:bodyPr>
+          <a:lstStyle/>
+          <a:p>
+            <a:r>
+              <a:rPr lang="en-US" dirty="0" smtClean="0"/>
+              <a:t>Adaptive agent on high/ medium /low strategy level.</a:t>
+            </a:r>
+          </a:p>
+          <a:p>
+            <a:endParaRPr lang="en-US" dirty="0" smtClean="0"/>
+          </a:p>
+          <a:p>
+            <a:r>
+              <a:rPr lang="en-US" dirty="0" smtClean="0"/>
+              <a:t>Collaboration</a:t>
+            </a:r>
+          </a:p>
+          <a:p>
+            <a:endParaRPr lang="en-US" dirty="0" smtClean="0"/>
+          </a:p>
+          <a:p>
+            <a:r>
+              <a:rPr lang="en-US" dirty="0" smtClean="0"/>
+              <a:t>Knowledge sharing</a:t>
+            </a:r>
+          </a:p>
+          <a:p>
+            <a:endParaRPr lang="en-US" dirty="0"/>
+          </a:p>
+          <a:p>
+            <a:r>
+              <a:rPr lang="en-US" dirty="0" smtClean="0"/>
+              <a:t>Anything else?</a:t>
+            </a:r>
+          </a:p>
+          <a:p>
+            <a:endParaRPr lang="en-US" dirty="0"/>
+          </a:p>
+        </p:txBody>
+      </p:sp>
+    </p:spTree>
+    <p:extLst>
+      <p:ext uri="{BB962C8B-B14F-4D97-AF65-F5344CB8AC3E}">
+        <p14:creationId xmlns:p14="http://schemas.microsoft.com/office/powerpoint/2010/main" val="159122329"/>
+      </p:ext>
+    </p:extLst>
+  </p:cSld>
+  <p:clrMapOvr>
+    <a:masterClrMapping/>
+  </p:clrMapOvr>
+  <p:timing>
+    <p:tnLst>
+      <p:par>
+        <p:cTn id="1" dur="indefinite" restart="never" nodeType="tmRoot"/>
+      </p:par>
+    </p:tnLst>
+  </p:timing>
+</p:sld>
+</file>
+
+<file path=ppt/slides/slide12.xml><?xml version="1.0" encoding="utf-8"?>
+<p:sld xmlns:a="http://schemas.openxmlformats.org/drawingml/2006/main" xmlns:r="http://schemas.openxmlformats.org/officeDocument/2006/relationships" xmlns:p="http://schemas.openxmlformats.org/presentationml/2006/main">
+  <p:cSld>
+    <p:spTree>
+      <p:nvGrpSpPr>
+        <p:cNvPr id="1" name=""/>
+        <p:cNvGrpSpPr/>
+        <p:nvPr/>
+      </p:nvGrpSpPr>
+      <p:grpSpPr>
+        <a:xfrm>
+          <a:off x="0" y="0"/>
+          <a:ext cx="0" cy="0"/>
+          <a:chOff x="0" y="0"/>
+          <a:chExt cx="0" cy="0"/>
+        </a:xfrm>
+      </p:grpSpPr>
+      <p:sp>
+        <p:nvSpPr>
+          <p:cNvPr id="2" name="Title 1"/>
+          <p:cNvSpPr>
+            <a:spLocks noGrp="1"/>
+          </p:cNvSpPr>
+          <p:nvPr>
+            <p:ph type="title"/>
+          </p:nvPr>
+        </p:nvSpPr>
         <p:spPr>
           <a:xfrm>
             <a:off x="457200" y="2819400"/>
@@ -3328,6 +3466,13 @@
   <p:clrMapOvr>
     <a:masterClrMapping/>
   </p:clrMapOvr>
+  <p:timing>
+    <p:tnLst>
+      <p:par>
+        <p:cTn id="1" dur="indefinite" restart="never" nodeType="tmRoot"/>
+      </p:par>
+    </p:tnLst>
+  </p:timing>
 </p:sld>
 </file>
 
@@ -3420,7 +3565,6 @@
               <a:rPr lang="en-US" dirty="0" smtClean="0"/>
               <a:t>Demo</a:t>
             </a:r>
-            <a:endParaRPr lang="en-US" dirty="0" smtClean="0"/>
           </a:p>
           <a:p>
             <a:r>
@@ -3666,6 +3810,13 @@
   <p:clrMapOvr>
     <a:masterClrMapping/>
   </p:clrMapOvr>
+  <p:timing>
+    <p:tnLst>
+      <p:par>
+        <p:cTn id="1" dur="indefinite" restart="never" nodeType="tmRoot"/>
+      </p:par>
+    </p:tnLst>
+  </p:timing>
 </p:sld>
 </file>
 
@@ -4314,7 +4465,7 @@
           <a:p>
             <a:r>
               <a:rPr lang="en-US" dirty="0" smtClean="0"/>
-              <a:t>Project resources</a:t>
+              <a:t>Actions</a:t>
             </a:r>
             <a:endParaRPr lang="en-US" dirty="0"/>
           </a:p>
@@ -4332,67 +4483,87 @@
         </p:nvSpPr>
         <p:spPr/>
         <p:txBody>
-          <a:bodyPr/>
-          <a:lstStyle/>
-          <a:p>
-            <a:r>
-              <a:rPr lang="en-US" dirty="0" smtClean="0"/>
-              <a:t>Thesis work: </a:t>
-            </a:r>
-            <a:r>
-              <a:rPr lang="en-US" dirty="0">
-                <a:hlinkClick r:id="rId2"/>
-              </a:rPr>
-              <a:t>https://</a:t>
-            </a:r>
-            <a:r>
-              <a:rPr lang="en-US" dirty="0" smtClean="0">
-                <a:hlinkClick r:id="rId2"/>
-              </a:rPr>
-              <a:t>github.com/ogail/thesis</a:t>
+          <a:bodyPr>
+            <a:normAutofit fontScale="85000" lnSpcReduction="20000"/>
+          </a:bodyPr>
+          <a:lstStyle/>
+          <a:p>
+            <a:r>
+              <a:rPr lang="en-US" dirty="0"/>
+              <a:t>How to take the </a:t>
+            </a:r>
+            <a:r>
+              <a:rPr lang="en-US" dirty="0" smtClean="0"/>
+              <a:t>opponent behavior into account when constructing the DT</a:t>
+            </a:r>
+          </a:p>
+          <a:p>
+            <a:r>
+              <a:rPr lang="en-US" dirty="0" smtClean="0"/>
+              <a:t>Real-Time retriever:</a:t>
+            </a:r>
+          </a:p>
+          <a:p>
+            <a:pPr lvl="1"/>
+            <a:r>
+              <a:rPr lang="en-US" dirty="0" smtClean="0"/>
+              <a:t>Pick an opponent</a:t>
+            </a:r>
+          </a:p>
+          <a:p>
+            <a:pPr lvl="1"/>
+            <a:r>
+              <a:rPr lang="en-US" dirty="0" smtClean="0"/>
+              <a:t>Change the current retriever to use DT</a:t>
+            </a:r>
+          </a:p>
+          <a:p>
+            <a:pPr lvl="1"/>
+            <a:r>
+              <a:rPr lang="en-US" dirty="0" smtClean="0"/>
+              <a:t>Find a way to learn a DT for a given goal</a:t>
+            </a:r>
+          </a:p>
+          <a:p>
+            <a:pPr lvl="2"/>
+            <a:r>
+              <a:rPr lang="en-US" dirty="0" smtClean="0"/>
+              <a:t>Find features that are represented and low-</a:t>
+            </a:r>
+            <a:r>
+              <a:rPr lang="en-US" dirty="0" err="1" smtClean="0"/>
+              <a:t>computative</a:t>
             </a:r>
             <a:endParaRPr lang="en-US" dirty="0" smtClean="0"/>
           </a:p>
           <a:p>
-            <a:endParaRPr lang="en-US" dirty="0"/>
-          </a:p>
-          <a:p>
-            <a:r>
-              <a:rPr lang="en-US" dirty="0" err="1" smtClean="0"/>
-              <a:t>Src</a:t>
-            </a:r>
-            <a:r>
-              <a:rPr lang="en-US" dirty="0" smtClean="0"/>
-              <a:t> code for the engine: </a:t>
-            </a:r>
-            <a:r>
-              <a:rPr lang="en-US" dirty="0">
-                <a:hlinkClick r:id="rId3"/>
-              </a:rPr>
-              <a:t>https://</a:t>
-            </a:r>
-            <a:r>
-              <a:rPr lang="en-US" dirty="0" smtClean="0">
-                <a:hlinkClick r:id="rId3"/>
-              </a:rPr>
-              <a:t>github.com/ogail/istrategizer</a:t>
-            </a:r>
-            <a:endParaRPr lang="en-US" dirty="0" smtClean="0"/>
-          </a:p>
-          <a:p>
-            <a:endParaRPr lang="en-US" dirty="0"/>
-          </a:p>
-          <a:p>
-            <a:r>
-              <a:rPr lang="en-US" smtClean="0"/>
-              <a:t>Demo: </a:t>
-            </a:r>
-            <a:r>
-              <a:rPr lang="en-US">
-                <a:hlinkClick r:id="rId4"/>
-              </a:rPr>
-              <a:t>http://www.youtube.com/watch?v=pHnX4xU1ojQ</a:t>
-            </a:r>
+            <a:r>
+              <a:rPr lang="en-US" dirty="0" smtClean="0"/>
+              <a:t>Metrics</a:t>
+            </a:r>
+          </a:p>
+          <a:p>
+            <a:pPr lvl="1"/>
+            <a:r>
+              <a:rPr lang="en-US" dirty="0" smtClean="0"/>
+              <a:t>FPS</a:t>
+            </a:r>
+          </a:p>
+          <a:p>
+            <a:pPr lvl="1"/>
+            <a:r>
+              <a:rPr lang="en-US" dirty="0" smtClean="0"/>
+              <a:t>How many games you can win</a:t>
+            </a:r>
+          </a:p>
+          <a:p>
+            <a:pPr lvl="1"/>
+            <a:r>
+              <a:rPr lang="en-US" dirty="0" smtClean="0"/>
+              <a:t>How many times the engine adapts to predefined scenarios</a:t>
+            </a:r>
+          </a:p>
+          <a:p>
             <a:endParaRPr lang="en-US" dirty="0"/>
           </a:p>
         </p:txBody>
@@ -4400,13 +4571,20 @@
     </p:spTree>
     <p:extLst>
       <p:ext uri="{BB962C8B-B14F-4D97-AF65-F5344CB8AC3E}">
-        <p14:creationId xmlns:p14="http://schemas.microsoft.com/office/powerpoint/2010/main" val="3099975016"/>
+        <p14:creationId xmlns:p14="http://schemas.microsoft.com/office/powerpoint/2010/main" val="2358011168"/>
       </p:ext>
     </p:extLst>
   </p:cSld>
   <p:clrMapOvr>
     <a:masterClrMapping/>
   </p:clrMapOvr>
+  <p:timing>
+    <p:tnLst>
+      <p:par>
+        <p:cTn id="1" dur="indefinite" restart="never" nodeType="tmRoot"/>
+      </p:par>
+    </p:tnLst>
+  </p:timing>
 </p:sld>
 </file>
 

</xml_diff>